<commit_message>
Update Do choose and do exist.pptx
</commit_message>
<xml_diff>
--- a/Do choose and do exist.pptx
+++ b/Do choose and do exist.pptx
@@ -13,15 +13,16 @@
     <p:sldId id="261" r:id="rId7"/>
     <p:sldId id="262" r:id="rId8"/>
     <p:sldId id="263" r:id="rId9"/>
+    <p:sldId id="264" r:id="rId10"/>
   </p:sldIdLst>
   <p:sldSz cx="12192000" cy="6858000"/>
   <p:notesSz cx="6858000" cy="9144000"/>
   <p:embeddedFontLst>
     <p:embeddedFont>
       <p:font typeface="Garamond" panose="02020404030301010803" pitchFamily="18" charset="0"/>
-      <p:regular r:id="rId10"/>
-      <p:bold r:id="rId11"/>
-      <p:italic r:id="rId12"/>
+      <p:regular r:id="rId11"/>
+      <p:bold r:id="rId12"/>
+      <p:italic r:id="rId13"/>
     </p:embeddedFont>
   </p:embeddedFontLst>
   <p:defaultTextStyle>
@@ -119,7 +120,16 @@
       </a:defRPr>
     </a:lvl9pPr>
   </p:defaultTextStyle>
+  <p:extLst>
+    <p:ext uri="{EFAFB233-063F-42B5-8137-9DF3F51BA10A}">
+      <p15:sldGuideLst xmlns:p15="http://schemas.microsoft.com/office/powerpoint/2012/main"/>
+    </p:ext>
+  </p:extLst>
 </p:presentation>
+</file>
+
+<file path=ppt/revisionInfo.xml><?xml version="1.0" encoding="utf-8"?>
+<p1510:revInfo xmlns:a="http://schemas.openxmlformats.org/drawingml/2006/main" xmlns:r="http://schemas.openxmlformats.org/officeDocument/2006/relationships" xmlns:p1510="http://schemas.microsoft.com/office/powerpoint/2015/10/main"/>
 </file>
 
 <file path=ppt/slideLayouts/slideLayout1.xml><?xml version="1.0" encoding="utf-8"?>
@@ -454,7 +464,7 @@
             <a:fld id="{B61BEF0D-F0BB-DE4B-95CE-6DB70DBA9567}" type="datetimeFigureOut">
               <a:rPr lang="en-US" dirty="0"/>
               <a:pPr/>
-              <a:t>3/26/2022</a:t>
+              <a:t>3/27/2022</a:t>
             </a:fld>
             <a:endParaRPr lang="en-US" dirty="0"/>
           </a:p>
@@ -775,7 +785,7 @@
             <a:fld id="{B61BEF0D-F0BB-DE4B-95CE-6DB70DBA9567}" type="datetimeFigureOut">
               <a:rPr lang="en-US" dirty="0"/>
               <a:pPr/>
-              <a:t>3/26/2022</a:t>
+              <a:t>3/27/2022</a:t>
             </a:fld>
             <a:endParaRPr lang="en-US" dirty="0"/>
           </a:p>
@@ -1020,7 +1030,7 @@
             <a:fld id="{B61BEF0D-F0BB-DE4B-95CE-6DB70DBA9567}" type="datetimeFigureOut">
               <a:rPr lang="en-US" dirty="0"/>
               <a:pPr/>
-              <a:t>3/26/2022</a:t>
+              <a:t>3/27/2022</a:t>
             </a:fld>
             <a:endParaRPr lang="en-US" dirty="0"/>
           </a:p>
@@ -1356,7 +1366,7 @@
             <a:fld id="{B61BEF0D-F0BB-DE4B-95CE-6DB70DBA9567}" type="datetimeFigureOut">
               <a:rPr lang="en-US" dirty="0"/>
               <a:pPr/>
-              <a:t>3/26/2022</a:t>
+              <a:t>3/27/2022</a:t>
             </a:fld>
             <a:endParaRPr lang="en-US" dirty="0"/>
           </a:p>
@@ -1700,7 +1710,7 @@
             <a:fld id="{B61BEF0D-F0BB-DE4B-95CE-6DB70DBA9567}" type="datetimeFigureOut">
               <a:rPr lang="en-US" dirty="0"/>
               <a:pPr/>
-              <a:t>3/26/2022</a:t>
+              <a:t>3/27/2022</a:t>
             </a:fld>
             <a:endParaRPr lang="en-US" dirty="0"/>
           </a:p>
@@ -2071,7 +2081,7 @@
             <a:fld id="{B61BEF0D-F0BB-DE4B-95CE-6DB70DBA9567}" type="datetimeFigureOut">
               <a:rPr lang="en-US" dirty="0"/>
               <a:pPr/>
-              <a:t>3/26/2022</a:t>
+              <a:t>3/27/2022</a:t>
             </a:fld>
             <a:endParaRPr lang="en-US" dirty="0"/>
           </a:p>
@@ -2538,7 +2548,7 @@
             <a:fld id="{B61BEF0D-F0BB-DE4B-95CE-6DB70DBA9567}" type="datetimeFigureOut">
               <a:rPr lang="en-US" dirty="0"/>
               <a:pPr/>
-              <a:t>3/26/2022</a:t>
+              <a:t>3/27/2022</a:t>
             </a:fld>
             <a:endParaRPr lang="en-US" dirty="0"/>
           </a:p>
@@ -2740,7 +2750,7 @@
             <a:fld id="{B61BEF0D-F0BB-DE4B-95CE-6DB70DBA9567}" type="datetimeFigureOut">
               <a:rPr lang="en-US" dirty="0"/>
               <a:pPr/>
-              <a:t>3/26/2022</a:t>
+              <a:t>3/27/2022</a:t>
             </a:fld>
             <a:endParaRPr lang="en-US" dirty="0"/>
           </a:p>
@@ -2948,7 +2958,7 @@
             <a:fld id="{B61BEF0D-F0BB-DE4B-95CE-6DB70DBA9567}" type="datetimeFigureOut">
               <a:rPr lang="en-US" dirty="0"/>
               <a:pPr/>
-              <a:t>3/26/2022</a:t>
+              <a:t>3/27/2022</a:t>
             </a:fld>
             <a:endParaRPr lang="en-US" dirty="0"/>
           </a:p>
@@ -3176,7 +3186,7 @@
           <a:p>
             <a:fld id="{05BFA754-D5C3-4E66-96A6-867B257F58DC}" type="datetimeFigureOut">
               <a:rPr lang="en-US" dirty="0"/>
-              <a:t>3/26/2022</a:t>
+              <a:t>3/27/2022</a:t>
             </a:fld>
             <a:endParaRPr lang="en-US" dirty="0"/>
           </a:p>
@@ -3420,7 +3430,7 @@
             <a:fld id="{B61BEF0D-F0BB-DE4B-95CE-6DB70DBA9567}" type="datetimeFigureOut">
               <a:rPr lang="en-US" dirty="0"/>
               <a:pPr/>
-              <a:t>3/26/2022</a:t>
+              <a:t>3/27/2022</a:t>
             </a:fld>
             <a:endParaRPr lang="en-US" dirty="0"/>
           </a:p>
@@ -3683,7 +3693,7 @@
           <a:p>
             <a:fld id="{05BFA754-D5C3-4E66-96A6-867B257F58DC}" type="datetimeFigureOut">
               <a:rPr lang="en-US" dirty="0"/>
-              <a:t>3/26/2022</a:t>
+              <a:t>3/27/2022</a:t>
             </a:fld>
             <a:endParaRPr lang="en-US" dirty="0"/>
           </a:p>
@@ -4092,7 +4102,7 @@
             <a:fld id="{B61BEF0D-F0BB-DE4B-95CE-6DB70DBA9567}" type="datetimeFigureOut">
               <a:rPr lang="en-US" dirty="0"/>
               <a:pPr/>
-              <a:t>3/26/2022</a:t>
+              <a:t>3/27/2022</a:t>
             </a:fld>
             <a:endParaRPr lang="en-US" dirty="0"/>
           </a:p>
@@ -4238,7 +4248,7 @@
             <a:fld id="{B61BEF0D-F0BB-DE4B-95CE-6DB70DBA9567}" type="datetimeFigureOut">
               <a:rPr lang="en-US" dirty="0"/>
               <a:pPr/>
-              <a:t>3/26/2022</a:t>
+              <a:t>3/27/2022</a:t>
             </a:fld>
             <a:endParaRPr lang="en-US" dirty="0"/>
           </a:p>
@@ -4361,7 +4371,7 @@
             <a:fld id="{B61BEF0D-F0BB-DE4B-95CE-6DB70DBA9567}" type="datetimeFigureOut">
               <a:rPr lang="en-US" dirty="0"/>
               <a:pPr/>
-              <a:t>3/26/2022</a:t>
+              <a:t>3/27/2022</a:t>
             </a:fld>
             <a:endParaRPr lang="en-US" dirty="0"/>
           </a:p>
@@ -4613,7 +4623,7 @@
             <a:fld id="{B61BEF0D-F0BB-DE4B-95CE-6DB70DBA9567}" type="datetimeFigureOut">
               <a:rPr lang="en-US" dirty="0"/>
               <a:pPr/>
-              <a:t>3/26/2022</a:t>
+              <a:t>3/27/2022</a:t>
             </a:fld>
             <a:endParaRPr lang="en-US" dirty="0"/>
           </a:p>
@@ -4925,7 +4935,7 @@
             <a:fld id="{B61BEF0D-F0BB-DE4B-95CE-6DB70DBA9567}" type="datetimeFigureOut">
               <a:rPr lang="en-US" dirty="0"/>
               <a:pPr/>
-              <a:t>3/26/2022</a:t>
+              <a:t>3/27/2022</a:t>
             </a:fld>
             <a:endParaRPr lang="en-US" dirty="0"/>
           </a:p>
@@ -5273,7 +5283,7 @@
             <a:fld id="{B61BEF0D-F0BB-DE4B-95CE-6DB70DBA9567}" type="datetimeFigureOut">
               <a:rPr lang="en-US" dirty="0"/>
               <a:pPr/>
-              <a:t>3/26/2022</a:t>
+              <a:t>3/27/2022</a:t>
             </a:fld>
             <a:endParaRPr lang="en-US" dirty="0"/>
           </a:p>
@@ -5847,7 +5857,7 @@
             </a:br>
             <a:r>
               <a:rPr lang="en-US" altLang="ko-KR" dirty="0"/>
-              <a:t>And do exist.</a:t>
+              <a:t>And do Exist.</a:t>
             </a:r>
             <a:endParaRPr lang="ko-KR" altLang="en-US" dirty="0"/>
           </a:p>
@@ -5922,7 +5932,7 @@
                   <a:schemeClr val="bg1"/>
                 </a:solidFill>
               </a:rPr>
-              <a:t> gives you a unforgettable presentation today.</a:t>
+              <a:t> gives you an unforgettable speech today.</a:t>
             </a:r>
             <a:endParaRPr lang="ko-KR" altLang="en-US" sz="2800" dirty="0">
               <a:solidFill>
@@ -6215,6 +6225,18 @@
   <p:clrMapOvr>
     <a:masterClrMapping/>
   </p:clrMapOvr>
+  <mc:AlternateContent xmlns:mc="http://schemas.openxmlformats.org/markup-compatibility/2006">
+    <mc:Choice xmlns:p14="http://schemas.microsoft.com/office/powerpoint/2010/main" Requires="p14">
+      <p:transition spd="slow">
+        <p14:flash/>
+      </p:transition>
+    </mc:Choice>
+    <mc:Fallback>
+      <p:transition spd="slow">
+        <p:fade/>
+      </p:transition>
+    </mc:Fallback>
+  </mc:AlternateContent>
   <p:timing>
     <p:tnLst>
       <p:par>
@@ -6236,7 +6258,7 @@
                             </p:stCondLst>
                             <p:childTnLst>
                               <p:par>
-                                <p:cTn id="5" presetID="1" presetClass="entr" presetSubtype="0" fill="hold" grpId="0" nodeType="clickEffect">
+                                <p:cTn id="5" presetID="14" presetClass="entr" presetSubtype="10" fill="hold" grpId="0" nodeType="clickEffect">
                                   <p:stCondLst>
                                     <p:cond delay="0"/>
                                   </p:stCondLst>
@@ -6261,18 +6283,28 @@
                                         <p:strVal val="visible"/>
                                       </p:to>
                                     </p:set>
+                                    <p:animEffect transition="in" filter="randombar(horizontal)">
+                                      <p:cBhvr>
+                                        <p:cTn id="7" dur="500"/>
+                                        <p:tgtEl>
+                                          <p:spTgt spid="3">
+                                            <p:bg/>
+                                          </p:spTgt>
+                                        </p:tgtEl>
+                                      </p:cBhvr>
+                                    </p:animEffect>
                                   </p:childTnLst>
                                 </p:cTn>
                               </p:par>
                               <p:par>
-                                <p:cTn id="7" presetID="1" presetClass="entr" presetSubtype="0" fill="hold" grpId="0" nodeType="withEffect">
+                                <p:cTn id="8" presetID="14" presetClass="entr" presetSubtype="10" fill="hold" grpId="0" nodeType="withEffect">
                                   <p:stCondLst>
                                     <p:cond delay="0"/>
                                   </p:stCondLst>
                                   <p:childTnLst>
                                     <p:set>
                                       <p:cBhvr>
-                                        <p:cTn id="8" dur="1" fill="hold">
+                                        <p:cTn id="9" dur="1" fill="hold">
                                           <p:stCondLst>
                                             <p:cond delay="0"/>
                                           </p:stCondLst>
@@ -6292,6 +6324,18 @@
                                         <p:strVal val="visible"/>
                                       </p:to>
                                     </p:set>
+                                    <p:animEffect transition="in" filter="randombar(horizontal)">
+                                      <p:cBhvr>
+                                        <p:cTn id="10" dur="500"/>
+                                        <p:tgtEl>
+                                          <p:spTgt spid="3">
+                                            <p:txEl>
+                                              <p:pRg st="0" end="0"/>
+                                            </p:txEl>
+                                          </p:spTgt>
+                                        </p:tgtEl>
+                                      </p:cBhvr>
+                                    </p:animEffect>
                                   </p:childTnLst>
                                 </p:cTn>
                               </p:par>
@@ -6926,6 +6970,9 @@
   <p:clrMapOvr>
     <a:masterClrMapping/>
   </p:clrMapOvr>
+  <p:transition spd="slow">
+    <p:push dir="u"/>
+  </p:transition>
   <p:timing>
     <p:tnLst>
       <p:par>
@@ -7079,14 +7126,95 @@
                             </p:stCondLst>
                             <p:childTnLst>
                               <p:par>
-                                <p:cTn id="15" presetID="1" presetClass="entr" presetSubtype="0" fill="hold" grpId="0" nodeType="clickEffect">
+                                <p:cTn id="15" presetID="47" presetClass="exit" presetSubtype="0" fill="hold" grpId="0" nodeType="clickEffect">
                                   <p:stCondLst>
                                     <p:cond delay="0"/>
                                   </p:stCondLst>
                                   <p:childTnLst>
+                                    <p:animEffect transition="out" filter="fade">
+                                      <p:cBhvr>
+                                        <p:cTn id="16" dur="1000"/>
+                                        <p:tgtEl>
+                                          <p:spTgt spid="2"/>
+                                        </p:tgtEl>
+                                      </p:cBhvr>
+                                    </p:animEffect>
+                                    <p:anim calcmode="lin" valueType="num">
+                                      <p:cBhvr>
+                                        <p:cTn id="17" dur="1000"/>
+                                        <p:tgtEl>
+                                          <p:spTgt spid="2"/>
+                                        </p:tgtEl>
+                                        <p:attrNameLst>
+                                          <p:attrName>ppt_x</p:attrName>
+                                        </p:attrNameLst>
+                                      </p:cBhvr>
+                                      <p:tavLst>
+                                        <p:tav tm="0">
+                                          <p:val>
+                                            <p:strVal val="ppt_x"/>
+                                          </p:val>
+                                        </p:tav>
+                                        <p:tav tm="100000">
+                                          <p:val>
+                                            <p:strVal val="ppt_x"/>
+                                          </p:val>
+                                        </p:tav>
+                                      </p:tavLst>
+                                    </p:anim>
+                                    <p:anim calcmode="lin" valueType="num">
+                                      <p:cBhvr>
+                                        <p:cTn id="18" dur="1000"/>
+                                        <p:tgtEl>
+                                          <p:spTgt spid="2"/>
+                                        </p:tgtEl>
+                                        <p:attrNameLst>
+                                          <p:attrName>ppt_y</p:attrName>
+                                        </p:attrNameLst>
+                                      </p:cBhvr>
+                                      <p:tavLst>
+                                        <p:tav tm="0">
+                                          <p:val>
+                                            <p:strVal val="ppt_y"/>
+                                          </p:val>
+                                        </p:tav>
+                                        <p:tav tm="100000">
+                                          <p:val>
+                                            <p:strVal val="ppt_y-.1"/>
+                                          </p:val>
+                                        </p:tav>
+                                      </p:tavLst>
+                                    </p:anim>
                                     <p:set>
                                       <p:cBhvr>
-                                        <p:cTn id="16" dur="1" fill="hold">
+                                        <p:cTn id="19" dur="1" fill="hold">
+                                          <p:stCondLst>
+                                            <p:cond delay="999"/>
+                                          </p:stCondLst>
+                                        </p:cTn>
+                                        <p:tgtEl>
+                                          <p:spTgt spid="2"/>
+                                        </p:tgtEl>
+                                        <p:attrNameLst>
+                                          <p:attrName>style.visibility</p:attrName>
+                                        </p:attrNameLst>
+                                      </p:cBhvr>
+                                      <p:to>
+                                        <p:strVal val="hidden"/>
+                                      </p:to>
+                                    </p:set>
+                                  </p:childTnLst>
+                                </p:cTn>
+                              </p:par>
+                              <p:par>
+                                <p:cTn id="20" presetID="42" presetClass="entr" presetSubtype="0" fill="hold" grpId="0" nodeType="withEffect">
+                                  <p:stCondLst>
+                                    <p:cond delay="500"/>
+                                  </p:stCondLst>
+                                  <p:childTnLst>
+                                    <p:set>
+                                      <p:cBhvr>
+                                        <p:cTn id="21" dur="1" fill="hold">
                                           <p:stCondLst>
                                             <p:cond delay="0"/>
                                           </p:stCondLst>
@@ -7102,33 +7230,60 @@
                                         <p:strVal val="visible"/>
                                       </p:to>
                                     </p:set>
-                                  </p:childTnLst>
-                                </p:cTn>
-                              </p:par>
-                              <p:par>
-                                <p:cTn id="17" presetID="1" presetClass="exit" presetSubtype="0" fill="hold" grpId="0" nodeType="withEffect">
-                                  <p:stCondLst>
-                                    <p:cond delay="0"/>
-                                  </p:stCondLst>
-                                  <p:childTnLst>
-                                    <p:set>
+                                    <p:animEffect transition="in" filter="fade">
                                       <p:cBhvr>
-                                        <p:cTn id="18" dur="1" fill="hold">
-                                          <p:stCondLst>
-                                            <p:cond delay="0"/>
-                                          </p:stCondLst>
-                                        </p:cTn>
+                                        <p:cTn id="22" dur="1000"/>
                                         <p:tgtEl>
-                                          <p:spTgt spid="2"/>
+                                          <p:spTgt spid="5"/>
+                                        </p:tgtEl>
+                                      </p:cBhvr>
+                                    </p:animEffect>
+                                    <p:anim calcmode="lin" valueType="num">
+                                      <p:cBhvr>
+                                        <p:cTn id="23" dur="1000" fill="hold"/>
+                                        <p:tgtEl>
+                                          <p:spTgt spid="5"/>
                                         </p:tgtEl>
                                         <p:attrNameLst>
-                                          <p:attrName>style.visibility</p:attrName>
+                                          <p:attrName>ppt_x</p:attrName>
                                         </p:attrNameLst>
                                       </p:cBhvr>
-                                      <p:to>
-                                        <p:strVal val="hidden"/>
-                                      </p:to>
-                                    </p:set>
+                                      <p:tavLst>
+                                        <p:tav tm="0">
+                                          <p:val>
+                                            <p:strVal val="#ppt_x"/>
+                                          </p:val>
+                                        </p:tav>
+                                        <p:tav tm="100000">
+                                          <p:val>
+                                            <p:strVal val="#ppt_x"/>
+                                          </p:val>
+                                        </p:tav>
+                                      </p:tavLst>
+                                    </p:anim>
+                                    <p:anim calcmode="lin" valueType="num">
+                                      <p:cBhvr>
+                                        <p:cTn id="24" dur="1000" fill="hold"/>
+                                        <p:tgtEl>
+                                          <p:spTgt spid="5"/>
+                                        </p:tgtEl>
+                                        <p:attrNameLst>
+                                          <p:attrName>ppt_y</p:attrName>
+                                        </p:attrNameLst>
+                                      </p:cBhvr>
+                                      <p:tavLst>
+                                        <p:tav tm="0">
+                                          <p:val>
+                                            <p:strVal val="#ppt_y+.1"/>
+                                          </p:val>
+                                        </p:tav>
+                                        <p:tav tm="100000">
+                                          <p:val>
+                                            <p:strVal val="#ppt_y"/>
+                                          </p:val>
+                                        </p:tav>
+                                      </p:tavLst>
+                                    </p:anim>
                                   </p:childTnLst>
                                 </p:cTn>
                               </p:par>
@@ -7357,6 +7512,18 @@
   <p:clrMapOvr>
     <a:masterClrMapping/>
   </p:clrMapOvr>
+  <mc:AlternateContent xmlns:mc="http://schemas.openxmlformats.org/markup-compatibility/2006">
+    <mc:Choice xmlns:p14="http://schemas.microsoft.com/office/powerpoint/2010/main" Requires="p14">
+      <p:transition spd="slow" p14:dur="1750">
+        <p:cover/>
+      </p:transition>
+    </mc:Choice>
+    <mc:Fallback>
+      <p:transition spd="slow">
+        <p:cover/>
+      </p:transition>
+    </mc:Fallback>
+  </mc:AlternateContent>
   <p:timing>
     <p:tnLst>
       <p:par>
@@ -7531,7 +7698,19 @@
           <a:p>
             <a:r>
               <a:rPr lang="en-US" altLang="ko-KR" dirty="0"/>
-              <a:t>About Choice</a:t>
+              <a:t>About </a:t>
+            </a:r>
+            <a:r>
+              <a:rPr lang="en-US" altLang="ko-KR" dirty="0">
+                <a:solidFill>
+                  <a:srgbClr val="4E983A"/>
+                </a:solidFill>
+              </a:rPr>
+              <a:t>C</a:t>
+            </a:r>
+            <a:r>
+              <a:rPr lang="en-US" altLang="ko-KR" dirty="0"/>
+              <a:t>hoice</a:t>
             </a:r>
             <a:endParaRPr lang="ko-KR" altLang="en-US" dirty="0"/>
           </a:p>
@@ -7660,6 +7839,18 @@
   <p:clrMapOvr>
     <a:masterClrMapping/>
   </p:clrMapOvr>
+  <mc:AlternateContent xmlns:mc="http://schemas.openxmlformats.org/markup-compatibility/2006">
+    <mc:Choice xmlns:p14="http://schemas.microsoft.com/office/powerpoint/2010/main" Requires="p14">
+      <p:transition spd="slow" p14:dur="1250">
+        <p14:flip dir="r"/>
+      </p:transition>
+    </mc:Choice>
+    <mc:Fallback>
+      <p:transition spd="slow">
+        <p:fade/>
+      </p:transition>
+    </mc:Fallback>
+  </mc:AlternateContent>
   <p:timing>
     <p:tnLst>
       <p:par>
@@ -8318,7 +8509,7 @@
         </p:nvSpPr>
         <p:spPr>
           <a:xfrm>
-            <a:off x="6032086" y="2556932"/>
+            <a:off x="6012422" y="2556932"/>
             <a:ext cx="4842389" cy="491068"/>
           </a:xfrm>
         </p:spPr>
@@ -8352,7 +8543,7 @@
         </p:nvSpPr>
         <p:spPr>
           <a:xfrm>
-            <a:off x="5673211" y="3073399"/>
+            <a:off x="5663379" y="3073399"/>
             <a:ext cx="2812027" cy="491068"/>
           </a:xfrm>
           <a:prstGeom prst="rect">
@@ -8621,6 +8812,18 @@
   <p:clrMapOvr>
     <a:masterClrMapping/>
   </p:clrMapOvr>
+  <mc:AlternateContent xmlns:mc="http://schemas.openxmlformats.org/markup-compatibility/2006">
+    <mc:Choice xmlns:p14="http://schemas.microsoft.com/office/powerpoint/2010/main" Requires="p14">
+      <p:transition spd="slow" p14:dur="1750">
+        <p:cover/>
+      </p:transition>
+    </mc:Choice>
+    <mc:Fallback>
+      <p:transition spd="slow">
+        <p:cover/>
+      </p:transition>
+    </mc:Fallback>
+  </mc:AlternateContent>
   <p:timing>
     <p:tnLst>
       <p:par>
@@ -9045,6 +9248,18 @@
   <p:clrMapOvr>
     <a:masterClrMapping/>
   </p:clrMapOvr>
+  <mc:AlternateContent xmlns:mc="http://schemas.openxmlformats.org/markup-compatibility/2006">
+    <mc:Choice xmlns:p14="http://schemas.microsoft.com/office/powerpoint/2010/main" Requires="p14">
+      <p:transition spd="slow">
+        <p14:flash/>
+      </p:transition>
+    </mc:Choice>
+    <mc:Fallback>
+      <p:transition spd="slow">
+        <p:fade/>
+      </p:transition>
+    </mc:Fallback>
+  </mc:AlternateContent>
   <p:timing>
     <p:tnLst>
       <p:par>
@@ -9285,397 +9500,18 @@
   <p:clrMapOvr>
     <a:masterClrMapping/>
   </p:clrMapOvr>
-</p:sld>
-</file>
-
-<file path=ppt/slides/slide8.xml><?xml version="1.0" encoding="utf-8"?>
-<p:sld xmlns:a="http://schemas.openxmlformats.org/drawingml/2006/main" xmlns:r="http://schemas.openxmlformats.org/officeDocument/2006/relationships" xmlns:p="http://schemas.openxmlformats.org/presentationml/2006/main">
-  <p:cSld>
-    <p:spTree>
-      <p:nvGrpSpPr>
-        <p:cNvPr id="1" name=""/>
-        <p:cNvGrpSpPr/>
-        <p:nvPr/>
-      </p:nvGrpSpPr>
-      <p:grpSpPr>
-        <a:xfrm>
-          <a:off x="0" y="0"/>
-          <a:ext cx="0" cy="0"/>
-          <a:chOff x="0" y="0"/>
-          <a:chExt cx="0" cy="0"/>
-        </a:xfrm>
-      </p:grpSpPr>
-      <p:sp>
-        <p:nvSpPr>
-          <p:cNvPr id="2" name="제목 1">
-            <a:extLst>
-              <a:ext uri="{FF2B5EF4-FFF2-40B4-BE49-F238E27FC236}">
-                <a16:creationId xmlns:a16="http://schemas.microsoft.com/office/drawing/2014/main" id="{DCF7DD63-EE7B-4CD5-A418-CFC832166819}"/>
-              </a:ext>
-            </a:extLst>
-          </p:cNvPr>
-          <p:cNvSpPr>
-            <a:spLocks noGrp="1"/>
-          </p:cNvSpPr>
-          <p:nvPr>
-            <p:ph type="ctrTitle"/>
-          </p:nvPr>
-        </p:nvSpPr>
-        <p:spPr>
-          <a:xfrm>
-            <a:off x="2692399" y="1554947"/>
-            <a:ext cx="6807204" cy="2803989"/>
-          </a:xfrm>
-        </p:spPr>
-        <p:txBody>
-          <a:bodyPr/>
-          <a:lstStyle/>
-          <a:p>
-            <a:r>
-              <a:rPr lang="en-US" altLang="ko-KR" dirty="0"/>
-              <a:t>Do Choose.</a:t>
-            </a:r>
-            <a:br>
-              <a:rPr lang="en-US" altLang="ko-KR" dirty="0"/>
-            </a:br>
-            <a:r>
-              <a:rPr lang="en-US" altLang="ko-KR" dirty="0"/>
-              <a:t>And do exist.</a:t>
-            </a:r>
-            <a:endParaRPr lang="ko-KR" altLang="en-US" dirty="0"/>
-          </a:p>
-        </p:txBody>
-      </p:sp>
-      <p:sp>
-        <p:nvSpPr>
-          <p:cNvPr id="5" name="부제목 2">
-            <a:extLst>
-              <a:ext uri="{FF2B5EF4-FFF2-40B4-BE49-F238E27FC236}">
-                <a16:creationId xmlns:a16="http://schemas.microsoft.com/office/drawing/2014/main" id="{68A2CF0C-E070-4B11-A084-257007E2EF72}"/>
-              </a:ext>
-            </a:extLst>
-          </p:cNvPr>
-          <p:cNvSpPr txBox="1">
-            <a:spLocks/>
-          </p:cNvSpPr>
-          <p:nvPr/>
-        </p:nvSpPr>
-        <p:spPr>
-          <a:xfrm>
-            <a:off x="7230369" y="4956824"/>
-            <a:ext cx="2623845" cy="488271"/>
-          </a:xfrm>
-          <a:prstGeom prst="rect">
-            <a:avLst/>
-          </a:prstGeom>
-        </p:spPr>
-        <p:txBody>
-          <a:bodyPr vert="horz" lIns="91440" tIns="45720" rIns="91440" bIns="45720" rtlCol="0" anchor="t">
-            <a:normAutofit/>
-          </a:bodyPr>
-          <a:lstStyle>
-            <a:lvl1pPr marL="0" indent="0" algn="ctr" defTabSz="457200" rtl="0" eaLnBrk="1" latinLnBrk="1" hangingPunct="1">
-              <a:spcBef>
-                <a:spcPct val="20000"/>
-              </a:spcBef>
-              <a:spcAft>
-                <a:spcPts val="600"/>
-              </a:spcAft>
-              <a:buClr>
-                <a:schemeClr val="accent1"/>
-              </a:buClr>
-              <a:buSzPct val="115000"/>
-              <a:buFont typeface="Arial"/>
-              <a:buNone/>
-              <a:defRPr sz="2100" kern="1200" cap="none">
-                <a:solidFill>
-                  <a:schemeClr val="tx1"/>
-                </a:solidFill>
-                <a:effectLst/>
-                <a:latin typeface="+mn-lt"/>
-                <a:ea typeface="+mn-ea"/>
-                <a:cs typeface="+mn-cs"/>
-              </a:defRPr>
-            </a:lvl1pPr>
-            <a:lvl2pPr marL="457200" indent="0" algn="ctr" defTabSz="457200" rtl="0" eaLnBrk="1" latinLnBrk="1" hangingPunct="1">
-              <a:spcBef>
-                <a:spcPct val="20000"/>
-              </a:spcBef>
-              <a:spcAft>
-                <a:spcPts val="600"/>
-              </a:spcAft>
-              <a:buClr>
-                <a:schemeClr val="accent1"/>
-              </a:buClr>
-              <a:buSzPct val="115000"/>
-              <a:buFont typeface="Arial"/>
-              <a:buNone/>
-              <a:defRPr sz="2000" kern="1200" cap="none">
-                <a:solidFill>
-                  <a:schemeClr val="tx1">
-                    <a:tint val="75000"/>
-                  </a:schemeClr>
-                </a:solidFill>
-                <a:effectLst/>
-                <a:latin typeface="+mn-lt"/>
-                <a:ea typeface="+mn-ea"/>
-                <a:cs typeface="+mn-cs"/>
-              </a:defRPr>
-            </a:lvl2pPr>
-            <a:lvl3pPr marL="914400" indent="0" algn="ctr" defTabSz="457200" rtl="0" eaLnBrk="1" latinLnBrk="1" hangingPunct="1">
-              <a:spcBef>
-                <a:spcPct val="20000"/>
-              </a:spcBef>
-              <a:spcAft>
-                <a:spcPts val="600"/>
-              </a:spcAft>
-              <a:buClr>
-                <a:schemeClr val="accent1"/>
-              </a:buClr>
-              <a:buSzPct val="115000"/>
-              <a:buFont typeface="Arial"/>
-              <a:buNone/>
-              <a:defRPr sz="1800" kern="1200" cap="none">
-                <a:solidFill>
-                  <a:schemeClr val="tx1">
-                    <a:tint val="75000"/>
-                  </a:schemeClr>
-                </a:solidFill>
-                <a:effectLst/>
-                <a:latin typeface="+mn-lt"/>
-                <a:ea typeface="+mn-ea"/>
-                <a:cs typeface="+mn-cs"/>
-              </a:defRPr>
-            </a:lvl3pPr>
-            <a:lvl4pPr marL="1371600" indent="0" algn="ctr" defTabSz="457200" rtl="0" eaLnBrk="1" latinLnBrk="1" hangingPunct="1">
-              <a:spcBef>
-                <a:spcPct val="20000"/>
-              </a:spcBef>
-              <a:spcAft>
-                <a:spcPts val="600"/>
-              </a:spcAft>
-              <a:buClr>
-                <a:schemeClr val="accent1"/>
-              </a:buClr>
-              <a:buSzPct val="115000"/>
-              <a:buFont typeface="Arial"/>
-              <a:buNone/>
-              <a:defRPr sz="1600" kern="1200" cap="none">
-                <a:solidFill>
-                  <a:schemeClr val="tx1">
-                    <a:tint val="75000"/>
-                  </a:schemeClr>
-                </a:solidFill>
-                <a:effectLst/>
-                <a:latin typeface="+mn-lt"/>
-                <a:ea typeface="+mn-ea"/>
-                <a:cs typeface="+mn-cs"/>
-              </a:defRPr>
-            </a:lvl4pPr>
-            <a:lvl5pPr marL="1828800" indent="0" algn="ctr" defTabSz="457200" rtl="0" eaLnBrk="1" latinLnBrk="1" hangingPunct="1">
-              <a:spcBef>
-                <a:spcPct val="20000"/>
-              </a:spcBef>
-              <a:spcAft>
-                <a:spcPts val="600"/>
-              </a:spcAft>
-              <a:buClr>
-                <a:schemeClr val="accent1"/>
-              </a:buClr>
-              <a:buSzPct val="115000"/>
-              <a:buFont typeface="Arial"/>
-              <a:buNone/>
-              <a:defRPr sz="1400" kern="1200" cap="none">
-                <a:solidFill>
-                  <a:schemeClr val="tx1">
-                    <a:tint val="75000"/>
-                  </a:schemeClr>
-                </a:solidFill>
-                <a:effectLst/>
-                <a:latin typeface="+mn-lt"/>
-                <a:ea typeface="+mn-ea"/>
-                <a:cs typeface="+mn-cs"/>
-              </a:defRPr>
-            </a:lvl5pPr>
-            <a:lvl6pPr marL="2286000" indent="0" algn="ctr" defTabSz="457200" rtl="0" eaLnBrk="1" latinLnBrk="1" hangingPunct="1">
-              <a:spcBef>
-                <a:spcPct val="20000"/>
-              </a:spcBef>
-              <a:spcAft>
-                <a:spcPts val="600"/>
-              </a:spcAft>
-              <a:buClr>
-                <a:schemeClr val="accent1"/>
-              </a:buClr>
-              <a:buSzPct val="115000"/>
-              <a:buFont typeface="Arial"/>
-              <a:buNone/>
-              <a:defRPr sz="1400" kern="1200" cap="none">
-                <a:solidFill>
-                  <a:schemeClr val="tx1">
-                    <a:tint val="75000"/>
-                  </a:schemeClr>
-                </a:solidFill>
-                <a:effectLst/>
-                <a:latin typeface="+mn-lt"/>
-                <a:ea typeface="+mn-ea"/>
-                <a:cs typeface="+mn-cs"/>
-              </a:defRPr>
-            </a:lvl6pPr>
-            <a:lvl7pPr marL="2743200" indent="0" algn="ctr" defTabSz="457200" rtl="0" eaLnBrk="1" latinLnBrk="1" hangingPunct="1">
-              <a:spcBef>
-                <a:spcPct val="20000"/>
-              </a:spcBef>
-              <a:spcAft>
-                <a:spcPts val="600"/>
-              </a:spcAft>
-              <a:buClr>
-                <a:schemeClr val="accent1"/>
-              </a:buClr>
-              <a:buSzPct val="115000"/>
-              <a:buFont typeface="Arial"/>
-              <a:buNone/>
-              <a:defRPr sz="1400" kern="1200" cap="none">
-                <a:solidFill>
-                  <a:schemeClr val="tx1">
-                    <a:tint val="75000"/>
-                  </a:schemeClr>
-                </a:solidFill>
-                <a:effectLst/>
-                <a:latin typeface="+mn-lt"/>
-                <a:ea typeface="+mn-ea"/>
-                <a:cs typeface="+mn-cs"/>
-              </a:defRPr>
-            </a:lvl7pPr>
-            <a:lvl8pPr marL="3200400" indent="0" algn="ctr" defTabSz="457200" rtl="0" eaLnBrk="1" latinLnBrk="1" hangingPunct="1">
-              <a:spcBef>
-                <a:spcPct val="20000"/>
-              </a:spcBef>
-              <a:spcAft>
-                <a:spcPts val="600"/>
-              </a:spcAft>
-              <a:buClr>
-                <a:schemeClr val="accent1"/>
-              </a:buClr>
-              <a:buSzPct val="115000"/>
-              <a:buFont typeface="Arial"/>
-              <a:buNone/>
-              <a:defRPr sz="1400" kern="1200" cap="none">
-                <a:solidFill>
-                  <a:schemeClr val="tx1">
-                    <a:tint val="75000"/>
-                  </a:schemeClr>
-                </a:solidFill>
-                <a:effectLst/>
-                <a:latin typeface="+mn-lt"/>
-                <a:ea typeface="+mn-ea"/>
-                <a:cs typeface="+mn-cs"/>
-              </a:defRPr>
-            </a:lvl8pPr>
-            <a:lvl9pPr marL="3657600" indent="0" algn="ctr" defTabSz="457200" rtl="0" eaLnBrk="1" latinLnBrk="1" hangingPunct="1">
-              <a:spcBef>
-                <a:spcPct val="20000"/>
-              </a:spcBef>
-              <a:spcAft>
-                <a:spcPts val="600"/>
-              </a:spcAft>
-              <a:buClr>
-                <a:schemeClr val="accent1"/>
-              </a:buClr>
-              <a:buSzPct val="115000"/>
-              <a:buFont typeface="Arial"/>
-              <a:buNone/>
-              <a:defRPr sz="1400" kern="1200" cap="none">
-                <a:solidFill>
-                  <a:schemeClr val="tx1">
-                    <a:tint val="75000"/>
-                  </a:schemeClr>
-                </a:solidFill>
-                <a:effectLst/>
-                <a:latin typeface="+mn-lt"/>
-                <a:ea typeface="+mn-ea"/>
-                <a:cs typeface="+mn-cs"/>
-              </a:defRPr>
-            </a:lvl9pPr>
-          </a:lstStyle>
-          <a:p>
-            <a:r>
-              <a:rPr lang="en-US" altLang="ko-KR" dirty="0"/>
-              <a:t>20619 Yeong-</a:t>
-            </a:r>
-            <a:r>
-              <a:rPr lang="en-US" altLang="ko-KR" dirty="0" err="1"/>
-              <a:t>wook</a:t>
-            </a:r>
-            <a:r>
-              <a:rPr lang="en-US" altLang="ko-KR" dirty="0"/>
-              <a:t> </a:t>
-            </a:r>
-            <a:r>
-              <a:rPr lang="en-US" altLang="ko-KR" dirty="0" err="1"/>
-              <a:t>Joo</a:t>
-            </a:r>
-            <a:endParaRPr lang="ko-KR" altLang="en-US" dirty="0"/>
-          </a:p>
-        </p:txBody>
-      </p:sp>
-      <p:sp>
-        <p:nvSpPr>
-          <p:cNvPr id="7" name="부제목 2">
-            <a:extLst>
-              <a:ext uri="{FF2B5EF4-FFF2-40B4-BE49-F238E27FC236}">
-                <a16:creationId xmlns:a16="http://schemas.microsoft.com/office/drawing/2014/main" id="{E160C9A2-0CE1-42F3-9E73-A8721177E902}"/>
-              </a:ext>
-            </a:extLst>
-          </p:cNvPr>
-          <p:cNvSpPr>
-            <a:spLocks noGrp="1"/>
-          </p:cNvSpPr>
-          <p:nvPr>
-            <p:ph type="subTitle" idx="1"/>
-          </p:nvPr>
-        </p:nvSpPr>
-        <p:spPr>
-          <a:xfrm>
-            <a:off x="-38470" y="3184864"/>
-            <a:ext cx="12268940" cy="488271"/>
-          </a:xfrm>
-          <a:solidFill>
-            <a:schemeClr val="tx1"/>
-          </a:solidFill>
-        </p:spPr>
-        <p:txBody>
-          <a:bodyPr>
-            <a:normAutofit lnSpcReduction="10000"/>
-          </a:bodyPr>
-          <a:lstStyle/>
-          <a:p>
-            <a:r>
-              <a:rPr lang="en-US" altLang="ko-KR" sz="2800" dirty="0">
-                <a:solidFill>
-                  <a:schemeClr val="bg1"/>
-                </a:solidFill>
-              </a:rPr>
-              <a:t>Thank you for listening!</a:t>
-            </a:r>
-            <a:endParaRPr lang="ko-KR" altLang="en-US" sz="2800" dirty="0">
-              <a:solidFill>
-                <a:schemeClr val="bg1"/>
-              </a:solidFill>
-            </a:endParaRPr>
-          </a:p>
-        </p:txBody>
-      </p:sp>
-    </p:spTree>
-    <p:extLst>
-      <p:ext uri="{BB962C8B-B14F-4D97-AF65-F5344CB8AC3E}">
-        <p14:creationId xmlns:p14="http://schemas.microsoft.com/office/powerpoint/2010/main" val="3559953019"/>
-      </p:ext>
-    </p:extLst>
-  </p:cSld>
-  <p:clrMapOvr>
-    <a:masterClrMapping/>
-  </p:clrMapOvr>
+  <mc:AlternateContent xmlns:mc="http://schemas.openxmlformats.org/markup-compatibility/2006">
+    <mc:Choice xmlns:p14="http://schemas.microsoft.com/office/powerpoint/2010/main" Requires="p14">
+      <p:transition spd="slow" p14:dur="1250">
+        <p14:flip dir="r"/>
+      </p:transition>
+    </mc:Choice>
+    <mc:Fallback>
+      <p:transition spd="slow">
+        <p:fade/>
+      </p:transition>
+    </mc:Fallback>
+  </mc:AlternateContent>
   <p:timing>
     <p:tnLst>
       <p:par>
@@ -9697,7 +9533,549 @@
                             </p:stCondLst>
                             <p:childTnLst>
                               <p:par>
-                                <p:cTn id="5" presetID="1" presetClass="entr" presetSubtype="0" fill="hold" grpId="0" nodeType="clickEffect">
+                                <p:cTn id="5" presetID="42" presetClass="entr" presetSubtype="0" fill="hold" grpId="0" nodeType="clickEffect">
+                                  <p:stCondLst>
+                                    <p:cond delay="0"/>
+                                  </p:stCondLst>
+                                  <p:childTnLst>
+                                    <p:set>
+                                      <p:cBhvr>
+                                        <p:cTn id="6" dur="1" fill="hold">
+                                          <p:stCondLst>
+                                            <p:cond delay="0"/>
+                                          </p:stCondLst>
+                                        </p:cTn>
+                                        <p:tgtEl>
+                                          <p:spTgt spid="3">
+                                            <p:txEl>
+                                              <p:pRg st="1" end="1"/>
+                                            </p:txEl>
+                                          </p:spTgt>
+                                        </p:tgtEl>
+                                        <p:attrNameLst>
+                                          <p:attrName>style.visibility</p:attrName>
+                                        </p:attrNameLst>
+                                      </p:cBhvr>
+                                      <p:to>
+                                        <p:strVal val="visible"/>
+                                      </p:to>
+                                    </p:set>
+                                    <p:animEffect transition="in" filter="fade">
+                                      <p:cBhvr>
+                                        <p:cTn id="7" dur="750"/>
+                                        <p:tgtEl>
+                                          <p:spTgt spid="3">
+                                            <p:txEl>
+                                              <p:pRg st="1" end="1"/>
+                                            </p:txEl>
+                                          </p:spTgt>
+                                        </p:tgtEl>
+                                      </p:cBhvr>
+                                    </p:animEffect>
+                                    <p:anim calcmode="lin" valueType="num">
+                                      <p:cBhvr>
+                                        <p:cTn id="8" dur="750" fill="hold"/>
+                                        <p:tgtEl>
+                                          <p:spTgt spid="3">
+                                            <p:txEl>
+                                              <p:pRg st="1" end="1"/>
+                                            </p:txEl>
+                                          </p:spTgt>
+                                        </p:tgtEl>
+                                        <p:attrNameLst>
+                                          <p:attrName>ppt_x</p:attrName>
+                                        </p:attrNameLst>
+                                      </p:cBhvr>
+                                      <p:tavLst>
+                                        <p:tav tm="0">
+                                          <p:val>
+                                            <p:strVal val="#ppt_x"/>
+                                          </p:val>
+                                        </p:tav>
+                                        <p:tav tm="100000">
+                                          <p:val>
+                                            <p:strVal val="#ppt_x"/>
+                                          </p:val>
+                                        </p:tav>
+                                      </p:tavLst>
+                                    </p:anim>
+                                    <p:anim calcmode="lin" valueType="num">
+                                      <p:cBhvr>
+                                        <p:cTn id="9" dur="750" fill="hold"/>
+                                        <p:tgtEl>
+                                          <p:spTgt spid="3">
+                                            <p:txEl>
+                                              <p:pRg st="1" end="1"/>
+                                            </p:txEl>
+                                          </p:spTgt>
+                                        </p:tgtEl>
+                                        <p:attrNameLst>
+                                          <p:attrName>ppt_y</p:attrName>
+                                        </p:attrNameLst>
+                                      </p:cBhvr>
+                                      <p:tavLst>
+                                        <p:tav tm="0">
+                                          <p:val>
+                                            <p:strVal val="#ppt_y+.1"/>
+                                          </p:val>
+                                        </p:tav>
+                                        <p:tav tm="100000">
+                                          <p:val>
+                                            <p:strVal val="#ppt_y"/>
+                                          </p:val>
+                                        </p:tav>
+                                      </p:tavLst>
+                                    </p:anim>
+                                  </p:childTnLst>
+                                </p:cTn>
+                              </p:par>
+                            </p:childTnLst>
+                          </p:cTn>
+                        </p:par>
+                      </p:childTnLst>
+                    </p:cTn>
+                  </p:par>
+                </p:childTnLst>
+              </p:cTn>
+              <p:prevCondLst>
+                <p:cond evt="onPrev" delay="0">
+                  <p:tgtEl>
+                    <p:sldTgt/>
+                  </p:tgtEl>
+                </p:cond>
+              </p:prevCondLst>
+              <p:nextCondLst>
+                <p:cond evt="onNext" delay="0">
+                  <p:tgtEl>
+                    <p:sldTgt/>
+                  </p:tgtEl>
+                </p:cond>
+              </p:nextCondLst>
+            </p:seq>
+          </p:childTnLst>
+        </p:cTn>
+      </p:par>
+    </p:tnLst>
+    <p:bldLst>
+      <p:bldP spid="3" grpId="0" build="p"/>
+    </p:bldLst>
+  </p:timing>
+</p:sld>
+</file>
+
+<file path=ppt/slides/slide8.xml><?xml version="1.0" encoding="utf-8"?>
+<p:sld xmlns:a="http://schemas.openxmlformats.org/drawingml/2006/main" xmlns:r="http://schemas.openxmlformats.org/officeDocument/2006/relationships" xmlns:p="http://schemas.openxmlformats.org/presentationml/2006/main">
+  <p:cSld>
+    <p:spTree>
+      <p:nvGrpSpPr>
+        <p:cNvPr id="1" name=""/>
+        <p:cNvGrpSpPr/>
+        <p:nvPr/>
+      </p:nvGrpSpPr>
+      <p:grpSpPr>
+        <a:xfrm>
+          <a:off x="0" y="0"/>
+          <a:ext cx="0" cy="0"/>
+          <a:chOff x="0" y="0"/>
+          <a:chExt cx="0" cy="0"/>
+        </a:xfrm>
+      </p:grpSpPr>
+      <p:sp>
+        <p:nvSpPr>
+          <p:cNvPr id="2" name="제목 1">
+            <a:extLst>
+              <a:ext uri="{FF2B5EF4-FFF2-40B4-BE49-F238E27FC236}">
+                <a16:creationId xmlns:a16="http://schemas.microsoft.com/office/drawing/2014/main" id="{DCF7DD63-EE7B-4CD5-A418-CFC832166819}"/>
+              </a:ext>
+            </a:extLst>
+          </p:cNvPr>
+          <p:cNvSpPr>
+            <a:spLocks noGrp="1"/>
+          </p:cNvSpPr>
+          <p:nvPr>
+            <p:ph type="ctrTitle"/>
+          </p:nvPr>
+        </p:nvSpPr>
+        <p:spPr>
+          <a:xfrm>
+            <a:off x="2692399" y="1554947"/>
+            <a:ext cx="6807204" cy="2803989"/>
+          </a:xfrm>
+        </p:spPr>
+        <p:txBody>
+          <a:bodyPr/>
+          <a:lstStyle/>
+          <a:p>
+            <a:r>
+              <a:rPr lang="en-US" altLang="ko-KR" dirty="0"/>
+              <a:t>Do Choose.</a:t>
+            </a:r>
+            <a:br>
+              <a:rPr lang="en-US" altLang="ko-KR" dirty="0"/>
+            </a:br>
+            <a:r>
+              <a:rPr lang="en-US" altLang="ko-KR" dirty="0"/>
+              <a:t>And do exist.</a:t>
+            </a:r>
+            <a:endParaRPr lang="ko-KR" altLang="en-US" dirty="0"/>
+          </a:p>
+        </p:txBody>
+      </p:sp>
+      <p:sp>
+        <p:nvSpPr>
+          <p:cNvPr id="5" name="부제목 2">
+            <a:extLst>
+              <a:ext uri="{FF2B5EF4-FFF2-40B4-BE49-F238E27FC236}">
+                <a16:creationId xmlns:a16="http://schemas.microsoft.com/office/drawing/2014/main" id="{68A2CF0C-E070-4B11-A084-257007E2EF72}"/>
+              </a:ext>
+            </a:extLst>
+          </p:cNvPr>
+          <p:cNvSpPr txBox="1">
+            <a:spLocks/>
+          </p:cNvSpPr>
+          <p:nvPr/>
+        </p:nvSpPr>
+        <p:spPr>
+          <a:xfrm>
+            <a:off x="7230369" y="4956824"/>
+            <a:ext cx="2623845" cy="488271"/>
+          </a:xfrm>
+          <a:prstGeom prst="rect">
+            <a:avLst/>
+          </a:prstGeom>
+        </p:spPr>
+        <p:txBody>
+          <a:bodyPr vert="horz" lIns="91440" tIns="45720" rIns="91440" bIns="45720" rtlCol="0" anchor="t">
+            <a:normAutofit/>
+          </a:bodyPr>
+          <a:lstStyle>
+            <a:lvl1pPr marL="0" indent="0" algn="ctr" defTabSz="457200" rtl="0" eaLnBrk="1" latinLnBrk="1" hangingPunct="1">
+              <a:spcBef>
+                <a:spcPct val="20000"/>
+              </a:spcBef>
+              <a:spcAft>
+                <a:spcPts val="600"/>
+              </a:spcAft>
+              <a:buClr>
+                <a:schemeClr val="accent1"/>
+              </a:buClr>
+              <a:buSzPct val="115000"/>
+              <a:buFont typeface="Arial"/>
+              <a:buNone/>
+              <a:defRPr sz="2100" kern="1200" cap="none">
+                <a:solidFill>
+                  <a:schemeClr val="tx1"/>
+                </a:solidFill>
+                <a:effectLst/>
+                <a:latin typeface="+mn-lt"/>
+                <a:ea typeface="+mn-ea"/>
+                <a:cs typeface="+mn-cs"/>
+              </a:defRPr>
+            </a:lvl1pPr>
+            <a:lvl2pPr marL="457200" indent="0" algn="ctr" defTabSz="457200" rtl="0" eaLnBrk="1" latinLnBrk="1" hangingPunct="1">
+              <a:spcBef>
+                <a:spcPct val="20000"/>
+              </a:spcBef>
+              <a:spcAft>
+                <a:spcPts val="600"/>
+              </a:spcAft>
+              <a:buClr>
+                <a:schemeClr val="accent1"/>
+              </a:buClr>
+              <a:buSzPct val="115000"/>
+              <a:buFont typeface="Arial"/>
+              <a:buNone/>
+              <a:defRPr sz="2000" kern="1200" cap="none">
+                <a:solidFill>
+                  <a:schemeClr val="tx1">
+                    <a:tint val="75000"/>
+                  </a:schemeClr>
+                </a:solidFill>
+                <a:effectLst/>
+                <a:latin typeface="+mn-lt"/>
+                <a:ea typeface="+mn-ea"/>
+                <a:cs typeface="+mn-cs"/>
+              </a:defRPr>
+            </a:lvl2pPr>
+            <a:lvl3pPr marL="914400" indent="0" algn="ctr" defTabSz="457200" rtl="0" eaLnBrk="1" latinLnBrk="1" hangingPunct="1">
+              <a:spcBef>
+                <a:spcPct val="20000"/>
+              </a:spcBef>
+              <a:spcAft>
+                <a:spcPts val="600"/>
+              </a:spcAft>
+              <a:buClr>
+                <a:schemeClr val="accent1"/>
+              </a:buClr>
+              <a:buSzPct val="115000"/>
+              <a:buFont typeface="Arial"/>
+              <a:buNone/>
+              <a:defRPr sz="1800" kern="1200" cap="none">
+                <a:solidFill>
+                  <a:schemeClr val="tx1">
+                    <a:tint val="75000"/>
+                  </a:schemeClr>
+                </a:solidFill>
+                <a:effectLst/>
+                <a:latin typeface="+mn-lt"/>
+                <a:ea typeface="+mn-ea"/>
+                <a:cs typeface="+mn-cs"/>
+              </a:defRPr>
+            </a:lvl3pPr>
+            <a:lvl4pPr marL="1371600" indent="0" algn="ctr" defTabSz="457200" rtl="0" eaLnBrk="1" latinLnBrk="1" hangingPunct="1">
+              <a:spcBef>
+                <a:spcPct val="20000"/>
+              </a:spcBef>
+              <a:spcAft>
+                <a:spcPts val="600"/>
+              </a:spcAft>
+              <a:buClr>
+                <a:schemeClr val="accent1"/>
+              </a:buClr>
+              <a:buSzPct val="115000"/>
+              <a:buFont typeface="Arial"/>
+              <a:buNone/>
+              <a:defRPr sz="1600" kern="1200" cap="none">
+                <a:solidFill>
+                  <a:schemeClr val="tx1">
+                    <a:tint val="75000"/>
+                  </a:schemeClr>
+                </a:solidFill>
+                <a:effectLst/>
+                <a:latin typeface="+mn-lt"/>
+                <a:ea typeface="+mn-ea"/>
+                <a:cs typeface="+mn-cs"/>
+              </a:defRPr>
+            </a:lvl4pPr>
+            <a:lvl5pPr marL="1828800" indent="0" algn="ctr" defTabSz="457200" rtl="0" eaLnBrk="1" latinLnBrk="1" hangingPunct="1">
+              <a:spcBef>
+                <a:spcPct val="20000"/>
+              </a:spcBef>
+              <a:spcAft>
+                <a:spcPts val="600"/>
+              </a:spcAft>
+              <a:buClr>
+                <a:schemeClr val="accent1"/>
+              </a:buClr>
+              <a:buSzPct val="115000"/>
+              <a:buFont typeface="Arial"/>
+              <a:buNone/>
+              <a:defRPr sz="1400" kern="1200" cap="none">
+                <a:solidFill>
+                  <a:schemeClr val="tx1">
+                    <a:tint val="75000"/>
+                  </a:schemeClr>
+                </a:solidFill>
+                <a:effectLst/>
+                <a:latin typeface="+mn-lt"/>
+                <a:ea typeface="+mn-ea"/>
+                <a:cs typeface="+mn-cs"/>
+              </a:defRPr>
+            </a:lvl5pPr>
+            <a:lvl6pPr marL="2286000" indent="0" algn="ctr" defTabSz="457200" rtl="0" eaLnBrk="1" latinLnBrk="1" hangingPunct="1">
+              <a:spcBef>
+                <a:spcPct val="20000"/>
+              </a:spcBef>
+              <a:spcAft>
+                <a:spcPts val="600"/>
+              </a:spcAft>
+              <a:buClr>
+                <a:schemeClr val="accent1"/>
+              </a:buClr>
+              <a:buSzPct val="115000"/>
+              <a:buFont typeface="Arial"/>
+              <a:buNone/>
+              <a:defRPr sz="1400" kern="1200" cap="none">
+                <a:solidFill>
+                  <a:schemeClr val="tx1">
+                    <a:tint val="75000"/>
+                  </a:schemeClr>
+                </a:solidFill>
+                <a:effectLst/>
+                <a:latin typeface="+mn-lt"/>
+                <a:ea typeface="+mn-ea"/>
+                <a:cs typeface="+mn-cs"/>
+              </a:defRPr>
+            </a:lvl6pPr>
+            <a:lvl7pPr marL="2743200" indent="0" algn="ctr" defTabSz="457200" rtl="0" eaLnBrk="1" latinLnBrk="1" hangingPunct="1">
+              <a:spcBef>
+                <a:spcPct val="20000"/>
+              </a:spcBef>
+              <a:spcAft>
+                <a:spcPts val="600"/>
+              </a:spcAft>
+              <a:buClr>
+                <a:schemeClr val="accent1"/>
+              </a:buClr>
+              <a:buSzPct val="115000"/>
+              <a:buFont typeface="Arial"/>
+              <a:buNone/>
+              <a:defRPr sz="1400" kern="1200" cap="none">
+                <a:solidFill>
+                  <a:schemeClr val="tx1">
+                    <a:tint val="75000"/>
+                  </a:schemeClr>
+                </a:solidFill>
+                <a:effectLst/>
+                <a:latin typeface="+mn-lt"/>
+                <a:ea typeface="+mn-ea"/>
+                <a:cs typeface="+mn-cs"/>
+              </a:defRPr>
+            </a:lvl7pPr>
+            <a:lvl8pPr marL="3200400" indent="0" algn="ctr" defTabSz="457200" rtl="0" eaLnBrk="1" latinLnBrk="1" hangingPunct="1">
+              <a:spcBef>
+                <a:spcPct val="20000"/>
+              </a:spcBef>
+              <a:spcAft>
+                <a:spcPts val="600"/>
+              </a:spcAft>
+              <a:buClr>
+                <a:schemeClr val="accent1"/>
+              </a:buClr>
+              <a:buSzPct val="115000"/>
+              <a:buFont typeface="Arial"/>
+              <a:buNone/>
+              <a:defRPr sz="1400" kern="1200" cap="none">
+                <a:solidFill>
+                  <a:schemeClr val="tx1">
+                    <a:tint val="75000"/>
+                  </a:schemeClr>
+                </a:solidFill>
+                <a:effectLst/>
+                <a:latin typeface="+mn-lt"/>
+                <a:ea typeface="+mn-ea"/>
+                <a:cs typeface="+mn-cs"/>
+              </a:defRPr>
+            </a:lvl8pPr>
+            <a:lvl9pPr marL="3657600" indent="0" algn="ctr" defTabSz="457200" rtl="0" eaLnBrk="1" latinLnBrk="1" hangingPunct="1">
+              <a:spcBef>
+                <a:spcPct val="20000"/>
+              </a:spcBef>
+              <a:spcAft>
+                <a:spcPts val="600"/>
+              </a:spcAft>
+              <a:buClr>
+                <a:schemeClr val="accent1"/>
+              </a:buClr>
+              <a:buSzPct val="115000"/>
+              <a:buFont typeface="Arial"/>
+              <a:buNone/>
+              <a:defRPr sz="1400" kern="1200" cap="none">
+                <a:solidFill>
+                  <a:schemeClr val="tx1">
+                    <a:tint val="75000"/>
+                  </a:schemeClr>
+                </a:solidFill>
+                <a:effectLst/>
+                <a:latin typeface="+mn-lt"/>
+                <a:ea typeface="+mn-ea"/>
+                <a:cs typeface="+mn-cs"/>
+              </a:defRPr>
+            </a:lvl9pPr>
+          </a:lstStyle>
+          <a:p>
+            <a:r>
+              <a:rPr lang="en-US" altLang="ko-KR" dirty="0"/>
+              <a:t>20619 Yeong-</a:t>
+            </a:r>
+            <a:r>
+              <a:rPr lang="en-US" altLang="ko-KR" dirty="0" err="1"/>
+              <a:t>wook</a:t>
+            </a:r>
+            <a:r>
+              <a:rPr lang="en-US" altLang="ko-KR" dirty="0"/>
+              <a:t> </a:t>
+            </a:r>
+            <a:r>
+              <a:rPr lang="en-US" altLang="ko-KR" dirty="0" err="1"/>
+              <a:t>Joo</a:t>
+            </a:r>
+            <a:endParaRPr lang="ko-KR" altLang="en-US" dirty="0"/>
+          </a:p>
+        </p:txBody>
+      </p:sp>
+      <p:sp>
+        <p:nvSpPr>
+          <p:cNvPr id="7" name="부제목 2">
+            <a:extLst>
+              <a:ext uri="{FF2B5EF4-FFF2-40B4-BE49-F238E27FC236}">
+                <a16:creationId xmlns:a16="http://schemas.microsoft.com/office/drawing/2014/main" id="{E160C9A2-0CE1-42F3-9E73-A8721177E902}"/>
+              </a:ext>
+            </a:extLst>
+          </p:cNvPr>
+          <p:cNvSpPr>
+            <a:spLocks noGrp="1"/>
+          </p:cNvSpPr>
+          <p:nvPr>
+            <p:ph type="subTitle" idx="1"/>
+          </p:nvPr>
+        </p:nvSpPr>
+        <p:spPr>
+          <a:xfrm>
+            <a:off x="-38470" y="3184864"/>
+            <a:ext cx="12268940" cy="488271"/>
+          </a:xfrm>
+          <a:solidFill>
+            <a:schemeClr val="tx1"/>
+          </a:solidFill>
+        </p:spPr>
+        <p:txBody>
+          <a:bodyPr>
+            <a:normAutofit lnSpcReduction="10000"/>
+          </a:bodyPr>
+          <a:lstStyle/>
+          <a:p>
+            <a:r>
+              <a:rPr lang="en-US" altLang="ko-KR" sz="2800" dirty="0">
+                <a:solidFill>
+                  <a:schemeClr val="bg1"/>
+                </a:solidFill>
+              </a:rPr>
+              <a:t>Thank you for listening!</a:t>
+            </a:r>
+            <a:endParaRPr lang="ko-KR" altLang="en-US" sz="2800" dirty="0">
+              <a:solidFill>
+                <a:schemeClr val="bg1"/>
+              </a:solidFill>
+            </a:endParaRPr>
+          </a:p>
+        </p:txBody>
+      </p:sp>
+    </p:spTree>
+    <p:extLst>
+      <p:ext uri="{BB962C8B-B14F-4D97-AF65-F5344CB8AC3E}">
+        <p14:creationId xmlns:p14="http://schemas.microsoft.com/office/powerpoint/2010/main" val="3559953019"/>
+      </p:ext>
+    </p:extLst>
+  </p:cSld>
+  <p:clrMapOvr>
+    <a:masterClrMapping/>
+  </p:clrMapOvr>
+  <p:transition spd="slow">
+    <p:push dir="u"/>
+  </p:transition>
+  <p:timing>
+    <p:tnLst>
+      <p:par>
+        <p:cTn id="1" dur="indefinite" restart="never" nodeType="tmRoot">
+          <p:childTnLst>
+            <p:seq concurrent="1" nextAc="seek">
+              <p:cTn id="2" dur="indefinite" nodeType="mainSeq">
+                <p:childTnLst>
+                  <p:par>
+                    <p:cTn id="3" fill="hold">
+                      <p:stCondLst>
+                        <p:cond delay="indefinite"/>
+                      </p:stCondLst>
+                      <p:childTnLst>
+                        <p:par>
+                          <p:cTn id="4" fill="hold">
+                            <p:stCondLst>
+                              <p:cond delay="0"/>
+                            </p:stCondLst>
+                            <p:childTnLst>
+                              <p:par>
+                                <p:cTn id="5" presetID="14" presetClass="entr" presetSubtype="10" fill="hold" grpId="0" nodeType="clickEffect">
                                   <p:stCondLst>
                                     <p:cond delay="0"/>
                                   </p:stCondLst>
@@ -9722,18 +10100,28 @@
                                         <p:strVal val="visible"/>
                                       </p:to>
                                     </p:set>
+                                    <p:animEffect transition="in" filter="randombar(horizontal)">
+                                      <p:cBhvr>
+                                        <p:cTn id="7" dur="500"/>
+                                        <p:tgtEl>
+                                          <p:spTgt spid="7">
+                                            <p:bg/>
+                                          </p:spTgt>
+                                        </p:tgtEl>
+                                      </p:cBhvr>
+                                    </p:animEffect>
                                   </p:childTnLst>
                                 </p:cTn>
                               </p:par>
                               <p:par>
-                                <p:cTn id="7" presetID="1" presetClass="entr" presetSubtype="0" fill="hold" grpId="0" nodeType="withEffect">
+                                <p:cTn id="8" presetID="14" presetClass="entr" presetSubtype="10" fill="hold" grpId="0" nodeType="withEffect">
                                   <p:stCondLst>
                                     <p:cond delay="0"/>
                                   </p:stCondLst>
                                   <p:childTnLst>
                                     <p:set>
                                       <p:cBhvr>
-                                        <p:cTn id="8" dur="1" fill="hold">
+                                        <p:cTn id="9" dur="1" fill="hold">
                                           <p:stCondLst>
                                             <p:cond delay="0"/>
                                           </p:stCondLst>
@@ -9753,6 +10141,18 @@
                                         <p:strVal val="visible"/>
                                       </p:to>
                                     </p:set>
+                                    <p:animEffect transition="in" filter="randombar(horizontal)">
+                                      <p:cBhvr>
+                                        <p:cTn id="10" dur="500"/>
+                                        <p:tgtEl>
+                                          <p:spTgt spid="7">
+                                            <p:txEl>
+                                              <p:pRg st="0" end="0"/>
+                                            </p:txEl>
+                                          </p:spTgt>
+                                        </p:tgtEl>
+                                      </p:cBhvr>
+                                    </p:animEffect>
                                   </p:childTnLst>
                                 </p:cTn>
                               </p:par>
@@ -9787,6 +10187,152 @@
       <p:bldP spid="7" grpId="0" uiExpand="1" build="p" animBg="1"/>
     </p:bldLst>
   </p:timing>
+</p:sld>
+</file>
+
+<file path=ppt/slides/slide9.xml><?xml version="1.0" encoding="utf-8"?>
+<p:sld xmlns:a="http://schemas.openxmlformats.org/drawingml/2006/main" xmlns:r="http://schemas.openxmlformats.org/officeDocument/2006/relationships" xmlns:p="http://schemas.openxmlformats.org/presentationml/2006/main">
+  <p:cSld>
+    <p:spTree>
+      <p:nvGrpSpPr>
+        <p:cNvPr id="1" name=""/>
+        <p:cNvGrpSpPr/>
+        <p:nvPr/>
+      </p:nvGrpSpPr>
+      <p:grpSpPr>
+        <a:xfrm>
+          <a:off x="0" y="0"/>
+          <a:ext cx="0" cy="0"/>
+          <a:chOff x="0" y="0"/>
+          <a:chExt cx="0" cy="0"/>
+        </a:xfrm>
+      </p:grpSpPr>
+      <p:sp>
+        <p:nvSpPr>
+          <p:cNvPr id="2" name="제목 1">
+            <a:extLst>
+              <a:ext uri="{FF2B5EF4-FFF2-40B4-BE49-F238E27FC236}">
+                <a16:creationId xmlns:a16="http://schemas.microsoft.com/office/drawing/2014/main" id="{F9400651-36A0-4F63-8EEF-8EED7C3E23C4}"/>
+              </a:ext>
+            </a:extLst>
+          </p:cNvPr>
+          <p:cNvSpPr>
+            <a:spLocks noGrp="1"/>
+          </p:cNvSpPr>
+          <p:nvPr>
+            <p:ph type="title"/>
+          </p:nvPr>
+        </p:nvSpPr>
+        <p:spPr/>
+        <p:txBody>
+          <a:bodyPr/>
+          <a:lstStyle/>
+          <a:p>
+            <a:endParaRPr lang="ko-KR" altLang="en-US"/>
+          </a:p>
+        </p:txBody>
+      </p:sp>
+      <p:sp>
+        <p:nvSpPr>
+          <p:cNvPr id="3" name="내용 개체 틀 2">
+            <a:extLst>
+              <a:ext uri="{FF2B5EF4-FFF2-40B4-BE49-F238E27FC236}">
+                <a16:creationId xmlns:a16="http://schemas.microsoft.com/office/drawing/2014/main" id="{E17E4F22-24E7-4C41-8B47-9AF039976263}"/>
+              </a:ext>
+            </a:extLst>
+          </p:cNvPr>
+          <p:cNvSpPr>
+            <a:spLocks noGrp="1"/>
+          </p:cNvSpPr>
+          <p:nvPr>
+            <p:ph idx="1"/>
+          </p:nvPr>
+        </p:nvSpPr>
+        <p:spPr/>
+        <p:txBody>
+          <a:bodyPr/>
+          <a:lstStyle/>
+          <a:p>
+            <a:endParaRPr lang="ko-KR" altLang="en-US"/>
+          </a:p>
+        </p:txBody>
+      </p:sp>
+      <p:sp>
+        <p:nvSpPr>
+          <p:cNvPr id="4" name="직사각형 3">
+            <a:extLst>
+              <a:ext uri="{FF2B5EF4-FFF2-40B4-BE49-F238E27FC236}">
+                <a16:creationId xmlns:a16="http://schemas.microsoft.com/office/drawing/2014/main" id="{3583F96A-424C-46B7-9826-B44A343AC5A8}"/>
+              </a:ext>
+            </a:extLst>
+          </p:cNvPr>
+          <p:cNvSpPr/>
+          <p:nvPr/>
+        </p:nvSpPr>
+        <p:spPr>
+          <a:xfrm>
+            <a:off x="0" y="0"/>
+            <a:ext cx="12192000" cy="6858000"/>
+          </a:xfrm>
+          <a:prstGeom prst="rect">
+            <a:avLst/>
+          </a:prstGeom>
+          <a:solidFill>
+            <a:schemeClr val="tx1"/>
+          </a:solidFill>
+          <a:ln>
+            <a:solidFill>
+              <a:schemeClr val="tx1"/>
+            </a:solidFill>
+          </a:ln>
+        </p:spPr>
+        <p:style>
+          <a:lnRef idx="2">
+            <a:schemeClr val="accent1">
+              <a:shade val="50000"/>
+            </a:schemeClr>
+          </a:lnRef>
+          <a:fillRef idx="1">
+            <a:schemeClr val="accent1"/>
+          </a:fillRef>
+          <a:effectRef idx="0">
+            <a:schemeClr val="accent1"/>
+          </a:effectRef>
+          <a:fontRef idx="minor">
+            <a:schemeClr val="lt1"/>
+          </a:fontRef>
+        </p:style>
+        <p:txBody>
+          <a:bodyPr rtlCol="0" anchor="ctr"/>
+          <a:lstStyle/>
+          <a:p>
+            <a:pPr algn="ctr"/>
+            <a:endParaRPr lang="ko-KR" altLang="en-US"/>
+          </a:p>
+        </p:txBody>
+      </p:sp>
+    </p:spTree>
+    <p:extLst>
+      <p:ext uri="{BB962C8B-B14F-4D97-AF65-F5344CB8AC3E}">
+        <p14:creationId xmlns:p14="http://schemas.microsoft.com/office/powerpoint/2010/main" val="1467306016"/>
+      </p:ext>
+    </p:extLst>
+  </p:cSld>
+  <p:clrMapOvr>
+    <a:masterClrMapping/>
+  </p:clrMapOvr>
+  <mc:AlternateContent xmlns:mc="http://schemas.openxmlformats.org/markup-compatibility/2006">
+    <mc:Choice xmlns:p15="http://schemas.microsoft.com/office/powerpoint/2012/main" Requires="p15">
+      <p:transition xmlns:p14="http://schemas.microsoft.com/office/powerpoint/2010/main" spd="slow" p14:dur="6000">
+        <p15:prstTrans prst="curtains"/>
+      </p:transition>
+    </mc:Choice>
+    <mc:Fallback>
+      <p:transition spd="slow">
+        <p:fade/>
+      </p:transition>
+    </mc:Fallback>
+  </mc:AlternateContent>
 </p:sld>
 </file>
 

</xml_diff>